<commit_message>
Feat: Basic cube renderization
</commit_message>
<xml_diff>
--- a/Presentation_Warnock.pptx
+++ b/Presentation_Warnock.pptx
@@ -245,7 +245,16 @@
       </a:defRPr>
     </a:lvl9pPr>
   </p:defaultTextStyle>
+  <p:extLst>
+    <p:ext uri="{EFAFB233-063F-42B5-8137-9DF3F51BA10A}">
+      <p15:sldGuideLst xmlns:p15="http://schemas.microsoft.com/office/powerpoint/2012/main"/>
+    </p:ext>
+  </p:extLst>
 </p:presentation>
+</file>
+
+<file path=ppt/revisionInfo.xml><?xml version="1.0" encoding="utf-8"?>
+<p1510:revInfo xmlns:a="http://schemas.openxmlformats.org/drawingml/2006/main" xmlns:r="http://schemas.openxmlformats.org/officeDocument/2006/relationships" xmlns:p1510="http://schemas.microsoft.com/office/powerpoint/2015/10/main"/>
 </file>
 
 <file path=ppt/notesMasters/notesMaster1.xml><?xml version="1.0" encoding="utf-8"?>
@@ -6654,8 +6663,13 @@
             </a:r>
             <a:r>
               <a:rPr lang="es-CO" sz="2800" dirty="0"/>
-              <a:t> para la implementación de la solución buscada.</a:t>
-            </a:r>
+              <a:t> para la implementación de la solución buscada.(Representación planos, </a:t>
+            </a:r>
+            <a:r>
+              <a:rPr lang="es-CO" sz="2800"/>
+              <a:t>intersección entre ellos)</a:t>
+            </a:r>
+            <a:endParaRPr lang="es-CO" sz="2800" dirty="0"/>
           </a:p>
           <a:p>
             <a:pPr marL="457200" lvl="0" indent="-419100" rtl="0">

</xml_diff>